<commit_message>
Aggiunte alcune correzioni alle slide
</commit_message>
<xml_diff>
--- a/presentazione_EN.pptx
+++ b/presentazione_EN.pptx
@@ -1249,7 +1249,67 @@
                 <a:effectLst/>
                 <a:latin typeface="Open Sans"/>
               </a:rPr>
-              <a:t>il software e le varie componenti fisiche sono quindi state testate per garantire che quello che noi ci aspettassimo su carta fosse davvero quello che accadesse nella realtà, è così e stato. Risultato non scontato.</a:t>
+              <a:t>il software e le varie componenti fisiche sono quindi state testate per garantire che quello che noi ci aspettassimo su carta fosse davvero quello che accadesse nella realtà, è così e stato. Il sistema Fine accoppiato con il </a:t>
+            </a:r>
+            <a:r>
+              <a:rPr lang="it-IT" b="0" i="0" dirty="0" err="1">
+                <a:solidFill>
+                  <a:srgbClr val="333333"/>
+                </a:solidFill>
+                <a:effectLst/>
+                <a:latin typeface="Open Sans"/>
+              </a:rPr>
+              <a:t>Coarse</a:t>
+            </a:r>
+            <a:r>
+              <a:rPr lang="it-IT" b="0" i="0" dirty="0">
+                <a:solidFill>
+                  <a:srgbClr val="333333"/>
+                </a:solidFill>
+                <a:effectLst/>
+                <a:latin typeface="Open Sans"/>
+              </a:rPr>
+              <a:t> è sempre riuscito a portare a 0 la media e quindi a compensare i </a:t>
+            </a:r>
+            <a:r>
+              <a:rPr lang="it-IT" b="0" i="0" dirty="0" err="1">
+                <a:solidFill>
+                  <a:srgbClr val="333333"/>
+                </a:solidFill>
+                <a:effectLst/>
+                <a:latin typeface="Open Sans"/>
+              </a:rPr>
+              <a:t>drift</a:t>
+            </a:r>
+            <a:r>
+              <a:rPr lang="it-IT" b="0" i="0" dirty="0">
+                <a:solidFill>
+                  <a:srgbClr val="333333"/>
+                </a:solidFill>
+                <a:effectLst/>
+                <a:latin typeface="Open Sans"/>
+              </a:rPr>
+              <a:t> del </a:t>
+            </a:r>
+            <a:r>
+              <a:rPr lang="it-IT" b="0" i="0" dirty="0" err="1">
+                <a:solidFill>
+                  <a:srgbClr val="333333"/>
+                </a:solidFill>
+                <a:effectLst/>
+                <a:latin typeface="Open Sans"/>
+              </a:rPr>
+              <a:t>sisteama</a:t>
+            </a:r>
+            <a:r>
+              <a:rPr lang="it-IT" b="0" i="0" dirty="0">
+                <a:solidFill>
+                  <a:srgbClr val="333333"/>
+                </a:solidFill>
+                <a:effectLst/>
+                <a:latin typeface="Open Sans"/>
+              </a:rPr>
+              <a:t>. Il sistema PID è riuscito a ridurre la deviazione di un fattore 7, e si è arrivati a fare un’iniezione in fibra multi modo con delle perdite inferiori al 40%.</a:t>
             </a:r>
           </a:p>
           <a:p>
@@ -1459,7 +1519,7 @@
                 <a:effectLst/>
                 <a:latin typeface="Open Sans"/>
               </a:rPr>
-              <a:t> La QKD è una branchia della comunicazione quantistica e che permette a due utenti, tipicamente chiamati Alice e Bob, di generare una chiave segreta casuale. Questa chiave verrà poi usata per cifrare la comunicazione tra i due. La QKD avviene tipicamente attraverso lo scambio di fotoni tra due telescopi. Per avere la QKD bisogna quindi che i due telescopi siano allineati ecco perché è necessario un sistema di allineamento.</a:t>
+              <a:t> La QKD è una branca della comunicazione quantistica e che permette a due utenti, tipicamente chiamati Alice e Bob, di generare una chiave segreta casuale. Questa chiave verrà poi usata per cifrare la comunicazione tra i due. La QKD avviene tipicamente attraverso lo scambio di fotoni tra due telescopi. Per avere la QKD bisogna quindi che i due telescopi siano allineati ecco perché è necessario un sistema di allineamento.</a:t>
             </a:r>
             <a:endParaRPr lang="en-US" dirty="0"/>
           </a:p>
@@ -6140,6 +6200,81 @@
       </p:grpSpPr>
       <p:sp>
         <p:nvSpPr>
+          <p:cNvPr id="18" name="Esplosione: 14 punte 17">
+            <a:extLst>
+              <a:ext uri="{FF2B5EF4-FFF2-40B4-BE49-F238E27FC236}">
+                <a16:creationId xmlns:a16="http://schemas.microsoft.com/office/drawing/2014/main" id="{09596D84-04EA-4AA3-990D-3C59B132313A}"/>
+              </a:ext>
+            </a:extLst>
+          </p:cNvPr>
+          <p:cNvSpPr/>
+          <p:nvPr/>
+        </p:nvSpPr>
+        <p:spPr>
+          <a:xfrm>
+            <a:off x="8307762" y="1586652"/>
+            <a:ext cx="2486609" cy="1446882"/>
+          </a:xfrm>
+          <a:prstGeom prst="irregularSeal2">
+            <a:avLst/>
+          </a:prstGeom>
+          <a:solidFill>
+            <a:srgbClr val="69D6F4"/>
+          </a:solidFill>
+          <a:ln w="38100">
+            <a:solidFill>
+              <a:schemeClr val="tx1">
+                <a:lumMod val="95000"/>
+                <a:lumOff val="5000"/>
+              </a:schemeClr>
+            </a:solidFill>
+          </a:ln>
+        </p:spPr>
+        <p:style>
+          <a:lnRef idx="2">
+            <a:schemeClr val="accent1">
+              <a:shade val="50000"/>
+            </a:schemeClr>
+          </a:lnRef>
+          <a:fillRef idx="1">
+            <a:schemeClr val="accent1"/>
+          </a:fillRef>
+          <a:effectRef idx="0">
+            <a:schemeClr val="accent1"/>
+          </a:effectRef>
+          <a:fontRef idx="minor">
+            <a:schemeClr val="lt1"/>
+          </a:fontRef>
+        </p:style>
+        <p:txBody>
+          <a:bodyPr rtlCol="0" anchor="ctr"/>
+          <a:lstStyle/>
+          <a:p>
+            <a:pPr algn="ctr"/>
+            <a:r>
+              <a:rPr lang="it-IT" b="1" dirty="0">
+                <a:solidFill>
+                  <a:schemeClr val="tx1">
+                    <a:lumMod val="95000"/>
+                    <a:lumOff val="5000"/>
+                  </a:schemeClr>
+                </a:solidFill>
+              </a:rPr>
+              <a:t>SD 7</a:t>
+            </a:r>
+            <a:endParaRPr lang="en-US" b="1" dirty="0">
+              <a:solidFill>
+                <a:schemeClr val="tx1">
+                  <a:lumMod val="95000"/>
+                  <a:lumOff val="5000"/>
+                </a:schemeClr>
+              </a:solidFill>
+            </a:endParaRPr>
+          </a:p>
+        </p:txBody>
+      </p:sp>
+      <p:sp>
+        <p:nvSpPr>
           <p:cNvPr id="3" name="Segnaposto testo 2">
             <a:extLst>
               <a:ext uri="{FF2B5EF4-FFF2-40B4-BE49-F238E27FC236}">
@@ -6568,6 +6703,148 @@
             <a:r>
               <a:rPr lang="en-US" dirty="0"/>
               <a:t>expected</a:t>
+            </a:r>
+          </a:p>
+        </p:txBody>
+      </p:sp>
+      <p:sp>
+        <p:nvSpPr>
+          <p:cNvPr id="17" name="Esplosione: 14 punte 16">
+            <a:extLst>
+              <a:ext uri="{FF2B5EF4-FFF2-40B4-BE49-F238E27FC236}">
+                <a16:creationId xmlns:a16="http://schemas.microsoft.com/office/drawing/2014/main" id="{AD96E8FD-6936-4DFB-A736-835027DF1622}"/>
+              </a:ext>
+            </a:extLst>
+          </p:cNvPr>
+          <p:cNvSpPr/>
+          <p:nvPr/>
+        </p:nvSpPr>
+        <p:spPr>
+          <a:xfrm>
+            <a:off x="10427322" y="2417764"/>
+            <a:ext cx="1395624" cy="982012"/>
+          </a:xfrm>
+          <a:prstGeom prst="irregularSeal2">
+            <a:avLst/>
+          </a:prstGeom>
+          <a:solidFill>
+            <a:srgbClr val="69D6F4"/>
+          </a:solidFill>
+          <a:ln w="38100">
+            <a:solidFill>
+              <a:schemeClr val="tx1">
+                <a:lumMod val="95000"/>
+                <a:lumOff val="5000"/>
+              </a:schemeClr>
+            </a:solidFill>
+          </a:ln>
+        </p:spPr>
+        <p:style>
+          <a:lnRef idx="2">
+            <a:schemeClr val="accent1">
+              <a:shade val="50000"/>
+            </a:schemeClr>
+          </a:lnRef>
+          <a:fillRef idx="1">
+            <a:schemeClr val="accent1"/>
+          </a:fillRef>
+          <a:effectRef idx="0">
+            <a:schemeClr val="accent1"/>
+          </a:effectRef>
+          <a:fontRef idx="minor">
+            <a:schemeClr val="lt1"/>
+          </a:fontRef>
+        </p:style>
+        <p:txBody>
+          <a:bodyPr rtlCol="0" anchor="ctr"/>
+          <a:lstStyle/>
+          <a:p>
+            <a:pPr algn="ctr"/>
+            <a:r>
+              <a:rPr lang="it-IT" b="1" dirty="0">
+                <a:solidFill>
+                  <a:schemeClr val="tx1">
+                    <a:lumMod val="95000"/>
+                    <a:lumOff val="5000"/>
+                  </a:schemeClr>
+                </a:solidFill>
+              </a:rPr>
+              <a:t>40%</a:t>
+            </a:r>
+            <a:endParaRPr lang="en-US" b="1" dirty="0">
+              <a:solidFill>
+                <a:schemeClr val="tx1">
+                  <a:lumMod val="95000"/>
+                  <a:lumOff val="5000"/>
+                </a:schemeClr>
+              </a:solidFill>
+            </a:endParaRPr>
+          </a:p>
+        </p:txBody>
+      </p:sp>
+      <p:sp>
+        <p:nvSpPr>
+          <p:cNvPr id="20" name="Esplosione: 14 punte 19">
+            <a:extLst>
+              <a:ext uri="{FF2B5EF4-FFF2-40B4-BE49-F238E27FC236}">
+                <a16:creationId xmlns:a16="http://schemas.microsoft.com/office/drawing/2014/main" id="{ECC9D51D-10DA-4621-B02E-6983E1F1307D}"/>
+              </a:ext>
+            </a:extLst>
+          </p:cNvPr>
+          <p:cNvSpPr/>
+          <p:nvPr/>
+        </p:nvSpPr>
+        <p:spPr>
+          <a:xfrm>
+            <a:off x="9995989" y="1879328"/>
+            <a:ext cx="1596765" cy="934355"/>
+          </a:xfrm>
+          <a:prstGeom prst="irregularSeal2">
+            <a:avLst/>
+          </a:prstGeom>
+          <a:solidFill>
+            <a:srgbClr val="69D6F4"/>
+          </a:solidFill>
+          <a:ln w="38100">
+            <a:solidFill>
+              <a:schemeClr val="tx1">
+                <a:lumMod val="95000"/>
+                <a:lumOff val="5000"/>
+              </a:schemeClr>
+            </a:solidFill>
+          </a:ln>
+        </p:spPr>
+        <p:style>
+          <a:lnRef idx="2">
+            <a:schemeClr val="accent1">
+              <a:shade val="50000"/>
+            </a:schemeClr>
+          </a:lnRef>
+          <a:fillRef idx="1">
+            <a:schemeClr val="accent1"/>
+          </a:fillRef>
+          <a:effectRef idx="0">
+            <a:schemeClr val="accent1"/>
+          </a:effectRef>
+          <a:fontRef idx="minor">
+            <a:schemeClr val="lt1"/>
+          </a:fontRef>
+        </p:style>
+        <p:txBody>
+          <a:bodyPr rtlCol="0" anchor="ctr"/>
+          <a:lstStyle/>
+          <a:p>
+            <a:pPr algn="ctr"/>
+            <a:r>
+              <a:rPr lang="en-US" sz="1400" b="1" dirty="0">
+                <a:solidFill>
+                  <a:schemeClr val="tx1">
+                    <a:lumMod val="95000"/>
+                    <a:lumOff val="5000"/>
+                  </a:schemeClr>
+                </a:solidFill>
+              </a:rPr>
+              <a:t>Mean 0</a:t>
             </a:r>
           </a:p>
         </p:txBody>
@@ -7334,7 +7611,7 @@
           <a:graphicData uri="http://schemas.openxmlformats.org/presentationml/2006/ole">
             <mc:AlternateContent xmlns:mc="http://schemas.openxmlformats.org/markup-compatibility/2006">
               <mc:Choice xmlns:v="urn:schemas-microsoft-com:vml" Requires="v">
-                <p:oleObj spid="_x0000_s1064" name="Acrobat Document" r:id="rId4" imgW="4848186" imgH="2533096" progId="AcroExch.Document.DC">
+                <p:oleObj spid="_x0000_s1073" name="Acrobat Document" r:id="rId4" imgW="4848186" imgH="2533096" progId="AcroExch.Document.DC">
                   <p:embed/>
                 </p:oleObj>
               </mc:Choice>

</xml_diff>